<commit_message>
Flipped the hospitaliztion threshold
</commit_message>
<xml_diff>
--- a/Graphs/Combined_graphs.pptx
+++ b/Graphs/Combined_graphs.pptx
@@ -6,6 +6,7 @@
   </p:sldMasterIdLst>
   <p:sldIdLst>
     <p:sldId id="256" r:id="rId2"/>
+    <p:sldId id="257" r:id="rId3"/>
   </p:sldIdLst>
   <p:sldSz cx="12192000" cy="6858000"/>
   <p:notesSz cx="6858000" cy="9144000"/>
@@ -104,6 +105,11 @@
       </a:defRPr>
     </a:lvl9pPr>
   </p:defaultTextStyle>
+  <p:extLst>
+    <p:ext uri="{EFAFB233-063F-42B5-8137-9DF3F51BA10A}">
+      <p15:sldGuideLst xmlns:p15="http://schemas.microsoft.com/office/powerpoint/2012/main"/>
+    </p:ext>
+  </p:extLst>
 </p:presentation>
 </file>
 
@@ -3546,7 +3552,7 @@
             <p:spPr>
               <a:xfrm>
                 <a:off x="6382717" y="551395"/>
-                <a:ext cx="228575" cy="246158"/>
+                <a:ext cx="229253" cy="246888"/>
               </a:xfrm>
               <a:prstGeom prst="rect">
                 <a:avLst/>
@@ -3619,6 +3625,177 @@
     <p:extLst>
       <p:ext uri="{BB962C8B-B14F-4D97-AF65-F5344CB8AC3E}">
         <p14:creationId xmlns:p14="http://schemas.microsoft.com/office/powerpoint/2010/main" val="369796832"/>
+      </p:ext>
+    </p:extLst>
+  </p:cSld>
+  <p:clrMapOvr>
+    <a:masterClrMapping/>
+  </p:clrMapOvr>
+</p:sld>
+</file>
+
+<file path=ppt/slides/slide2.xml><?xml version="1.0" encoding="utf-8"?>
+<p:sld xmlns:a="http://schemas.openxmlformats.org/drawingml/2006/main" xmlns:r="http://schemas.openxmlformats.org/officeDocument/2006/relationships" xmlns:p="http://schemas.openxmlformats.org/presentationml/2006/main">
+  <p:cSld>
+    <p:spTree>
+      <p:nvGrpSpPr>
+        <p:cNvPr id="1" name=""/>
+        <p:cNvGrpSpPr/>
+        <p:nvPr/>
+      </p:nvGrpSpPr>
+      <p:grpSpPr>
+        <a:xfrm>
+          <a:off x="0" y="0"/>
+          <a:ext cx="0" cy="0"/>
+          <a:chOff x="0" y="0"/>
+          <a:chExt cx="0" cy="0"/>
+        </a:xfrm>
+      </p:grpSpPr>
+      <p:grpSp>
+        <p:nvGrpSpPr>
+          <p:cNvPr id="14" name="Group 13">
+            <a:extLst>
+              <a:ext uri="{FF2B5EF4-FFF2-40B4-BE49-F238E27FC236}">
+                <a16:creationId xmlns:a16="http://schemas.microsoft.com/office/drawing/2014/main" id="{A2D264EA-9BCA-080C-A52B-D4B065AAF188}"/>
+              </a:ext>
+            </a:extLst>
+          </p:cNvPr>
+          <p:cNvGrpSpPr/>
+          <p:nvPr/>
+        </p:nvGrpSpPr>
+        <p:grpSpPr>
+          <a:xfrm>
+            <a:off x="936666" y="823292"/>
+            <a:ext cx="9843925" cy="4961558"/>
+            <a:chOff x="936666" y="823292"/>
+            <a:chExt cx="9843925" cy="4961558"/>
+          </a:xfrm>
+        </p:grpSpPr>
+        <p:pic>
+          <p:nvPicPr>
+            <p:cNvPr id="8" name="Picture 7">
+              <a:extLst>
+                <a:ext uri="{FF2B5EF4-FFF2-40B4-BE49-F238E27FC236}">
+                  <a16:creationId xmlns:a16="http://schemas.microsoft.com/office/drawing/2014/main" id="{C1A8C6B1-EC97-B1B4-1811-966EBDAAADF9}"/>
+                </a:ext>
+              </a:extLst>
+            </p:cNvPr>
+            <p:cNvPicPr>
+              <a:picLocks noChangeAspect="1"/>
+            </p:cNvPicPr>
+            <p:nvPr/>
+          </p:nvPicPr>
+          <p:blipFill>
+            <a:blip r:embed="rId2"/>
+            <a:stretch>
+              <a:fillRect/>
+            </a:stretch>
+          </p:blipFill>
+          <p:spPr>
+            <a:xfrm>
+              <a:off x="936666" y="1073150"/>
+              <a:ext cx="4191000" cy="4711700"/>
+            </a:xfrm>
+            <a:prstGeom prst="rect">
+              <a:avLst/>
+            </a:prstGeom>
+          </p:spPr>
+        </p:pic>
+        <p:pic>
+          <p:nvPicPr>
+            <p:cNvPr id="9" name="Picture 8">
+              <a:extLst>
+                <a:ext uri="{FF2B5EF4-FFF2-40B4-BE49-F238E27FC236}">
+                  <a16:creationId xmlns:a16="http://schemas.microsoft.com/office/drawing/2014/main" id="{CD7B893F-B3AB-C5A4-3E88-7F58556AC9A1}"/>
+                </a:ext>
+              </a:extLst>
+            </p:cNvPr>
+            <p:cNvPicPr>
+              <a:picLocks noChangeAspect="1"/>
+            </p:cNvPicPr>
+            <p:nvPr/>
+          </p:nvPicPr>
+          <p:blipFill>
+            <a:blip r:embed="rId3"/>
+            <a:stretch>
+              <a:fillRect/>
+            </a:stretch>
+          </p:blipFill>
+          <p:spPr>
+            <a:xfrm>
+              <a:off x="1411409" y="826992"/>
+              <a:ext cx="228575" cy="246158"/>
+            </a:xfrm>
+            <a:prstGeom prst="rect">
+              <a:avLst/>
+            </a:prstGeom>
+          </p:spPr>
+        </p:pic>
+        <p:pic>
+          <p:nvPicPr>
+            <p:cNvPr id="12" name="Picture 11">
+              <a:extLst>
+                <a:ext uri="{FF2B5EF4-FFF2-40B4-BE49-F238E27FC236}">
+                  <a16:creationId xmlns:a16="http://schemas.microsoft.com/office/drawing/2014/main" id="{9BF5E7D6-783A-3D23-7E66-726A2C27035A}"/>
+                </a:ext>
+              </a:extLst>
+            </p:cNvPr>
+            <p:cNvPicPr>
+              <a:picLocks noChangeAspect="1"/>
+            </p:cNvPicPr>
+            <p:nvPr/>
+          </p:nvPicPr>
+          <p:blipFill>
+            <a:blip r:embed="rId4"/>
+            <a:stretch>
+              <a:fillRect/>
+            </a:stretch>
+          </p:blipFill>
+          <p:spPr>
+            <a:xfrm>
+              <a:off x="5408551" y="1070180"/>
+              <a:ext cx="5372040" cy="3881299"/>
+            </a:xfrm>
+            <a:prstGeom prst="rect">
+              <a:avLst/>
+            </a:prstGeom>
+          </p:spPr>
+        </p:pic>
+        <p:pic>
+          <p:nvPicPr>
+            <p:cNvPr id="13" name="Picture 12">
+              <a:extLst>
+                <a:ext uri="{FF2B5EF4-FFF2-40B4-BE49-F238E27FC236}">
+                  <a16:creationId xmlns:a16="http://schemas.microsoft.com/office/drawing/2014/main" id="{5644B219-8AE5-BD6B-6DEA-E5D91BE58794}"/>
+                </a:ext>
+              </a:extLst>
+            </p:cNvPr>
+            <p:cNvPicPr>
+              <a:picLocks noChangeAspect="1"/>
+            </p:cNvPicPr>
+            <p:nvPr/>
+          </p:nvPicPr>
+          <p:blipFill>
+            <a:blip r:embed="rId5"/>
+            <a:stretch>
+              <a:fillRect/>
+            </a:stretch>
+          </p:blipFill>
+          <p:spPr>
+            <a:xfrm>
+              <a:off x="6096000" y="823292"/>
+              <a:ext cx="229253" cy="246888"/>
+            </a:xfrm>
+            <a:prstGeom prst="rect">
+              <a:avLst/>
+            </a:prstGeom>
+          </p:spPr>
+        </p:pic>
+      </p:grpSp>
+    </p:spTree>
+    <p:extLst>
+      <p:ext uri="{BB962C8B-B14F-4D97-AF65-F5344CB8AC3E}">
+        <p14:creationId xmlns:p14="http://schemas.microsoft.com/office/powerpoint/2010/main" val="4181385714"/>
       </p:ext>
     </p:extLst>
   </p:cSld>

</xml_diff>

<commit_message>
Tidied up leged on graph
</commit_message>
<xml_diff>
--- a/Graphs/Combined_graphs.pptx
+++ b/Graphs/Combined_graphs.pptx
@@ -7,6 +7,7 @@
   <p:sldIdLst>
     <p:sldId id="256" r:id="rId2"/>
     <p:sldId id="257" r:id="rId3"/>
+    <p:sldId id="258" r:id="rId4"/>
   </p:sldIdLst>
   <p:sldSz cx="12192000" cy="6858000"/>
   <p:notesSz cx="6858000" cy="9144000"/>
@@ -3805,6 +3806,94 @@
 </p:sld>
 </file>
 
+<file path=ppt/slides/slide3.xml><?xml version="1.0" encoding="utf-8"?>
+<p:sld xmlns:a="http://schemas.openxmlformats.org/drawingml/2006/main" xmlns:r="http://schemas.openxmlformats.org/officeDocument/2006/relationships" xmlns:p="http://schemas.openxmlformats.org/presentationml/2006/main">
+  <p:cSld>
+    <p:spTree>
+      <p:nvGrpSpPr>
+        <p:cNvPr id="1" name=""/>
+        <p:cNvGrpSpPr/>
+        <p:nvPr/>
+      </p:nvGrpSpPr>
+      <p:grpSpPr>
+        <a:xfrm>
+          <a:off x="0" y="0"/>
+          <a:ext cx="0" cy="0"/>
+          <a:chOff x="0" y="0"/>
+          <a:chExt cx="0" cy="0"/>
+        </a:xfrm>
+      </p:grpSpPr>
+      <p:pic>
+        <p:nvPicPr>
+          <p:cNvPr id="5" name="Content Placeholder 4" descr="A graph of a normalized mcc&#10;&#10;Description automatically generated">
+            <a:extLst>
+              <a:ext uri="{FF2B5EF4-FFF2-40B4-BE49-F238E27FC236}">
+                <a16:creationId xmlns:a16="http://schemas.microsoft.com/office/drawing/2014/main" id="{DAB4A13C-B306-6E7B-ECC7-A3CD97209397}"/>
+              </a:ext>
+            </a:extLst>
+          </p:cNvPr>
+          <p:cNvPicPr>
+            <a:picLocks noGrp="1" noChangeAspect="1"/>
+          </p:cNvPicPr>
+          <p:nvPr>
+            <p:ph idx="1"/>
+          </p:nvPr>
+        </p:nvPicPr>
+        <p:blipFill rotWithShape="1">
+          <a:blip r:embed="rId2"/>
+          <a:srcRect l="7971" r="8187"/>
+          <a:stretch/>
+        </p:blipFill>
+        <p:spPr>
+          <a:xfrm>
+            <a:off x="838200" y="186433"/>
+            <a:ext cx="8816439" cy="3402105"/>
+          </a:xfrm>
+        </p:spPr>
+      </p:pic>
+      <p:pic>
+        <p:nvPicPr>
+          <p:cNvPr id="6" name="Picture 5">
+            <a:extLst>
+              <a:ext uri="{FF2B5EF4-FFF2-40B4-BE49-F238E27FC236}">
+                <a16:creationId xmlns:a16="http://schemas.microsoft.com/office/drawing/2014/main" id="{0F6882DA-C79A-7C68-2EF4-1483885AB767}"/>
+              </a:ext>
+            </a:extLst>
+          </p:cNvPr>
+          <p:cNvPicPr>
+            <a:picLocks noChangeAspect="1"/>
+          </p:cNvPicPr>
+          <p:nvPr/>
+        </p:nvPicPr>
+        <p:blipFill>
+          <a:blip r:embed="rId3"/>
+          <a:stretch>
+            <a:fillRect/>
+          </a:stretch>
+        </p:blipFill>
+        <p:spPr>
+          <a:xfrm>
+            <a:off x="3524332" y="3588538"/>
+            <a:ext cx="3860800" cy="495300"/>
+          </a:xfrm>
+          <a:prstGeom prst="rect">
+            <a:avLst/>
+          </a:prstGeom>
+        </p:spPr>
+      </p:pic>
+    </p:spTree>
+    <p:extLst>
+      <p:ext uri="{BB962C8B-B14F-4D97-AF65-F5344CB8AC3E}">
+        <p14:creationId xmlns:p14="http://schemas.microsoft.com/office/powerpoint/2010/main" val="3850670044"/>
+      </p:ext>
+    </p:extLst>
+  </p:cSld>
+  <p:clrMapOvr>
+    <a:masterClrMapping/>
+  </p:clrMapOvr>
+</p:sld>
+</file>
+
 <file path=ppt/theme/theme1.xml><?xml version="1.0" encoding="utf-8"?>
 <a:theme xmlns:a="http://schemas.openxmlformats.org/drawingml/2006/main" name="Office Theme">
   <a:themeElements>

</xml_diff>

<commit_message>
New combined graph for shifted
</commit_message>
<xml_diff>
--- a/Graphs/Combined_graphs.pptx
+++ b/Graphs/Combined_graphs.pptx
@@ -5,15 +5,16 @@
     <p:sldMasterId id="2147483648" r:id="rId1"/>
   </p:sldMasterIdLst>
   <p:notesMasterIdLst>
-    <p:notesMasterId r:id="rId8"/>
+    <p:notesMasterId r:id="rId9"/>
   </p:notesMasterIdLst>
   <p:sldIdLst>
     <p:sldId id="256" r:id="rId2"/>
-    <p:sldId id="257" r:id="rId3"/>
-    <p:sldId id="261" r:id="rId4"/>
-    <p:sldId id="258" r:id="rId5"/>
-    <p:sldId id="259" r:id="rId6"/>
-    <p:sldId id="260" r:id="rId7"/>
+    <p:sldId id="262" r:id="rId3"/>
+    <p:sldId id="257" r:id="rId4"/>
+    <p:sldId id="261" r:id="rId5"/>
+    <p:sldId id="258" r:id="rId6"/>
+    <p:sldId id="259" r:id="rId7"/>
+    <p:sldId id="260" r:id="rId8"/>
   </p:sldIdLst>
   <p:sldSz cx="12192000" cy="6858000"/>
   <p:notesSz cx="6858000" cy="9144000"/>
@@ -202,7 +203,7 @@
           <a:p>
             <a:fld id="{9442208E-7104-FB4B-B94B-F0E00CF730CE}" type="datetimeFigureOut">
               <a:rPr lang="en-US" smtClean="0"/>
-              <a:t>11/27/23</a:t>
+              <a:t>12/12/23</a:t>
             </a:fld>
             <a:endParaRPr lang="en-US"/>
           </a:p>
@@ -513,7 +514,7 @@
           <a:bodyPr/>
           <a:lstStyle/>
           <a:p>
-            <a:endParaRPr lang="en-US"/>
+            <a:endParaRPr lang="en-US" dirty="0"/>
           </a:p>
         </p:txBody>
       </p:sp>
@@ -534,7 +535,259 @@
           <a:p>
             <a:fld id="{CB797A4D-4A54-014D-A969-C0497745592B}" type="slidenum">
               <a:rPr lang="en-US" smtClean="0"/>
-              <a:t>6</a:t>
+              <a:t>1</a:t>
+            </a:fld>
+            <a:endParaRPr lang="en-US"/>
+          </a:p>
+        </p:txBody>
+      </p:sp>
+    </p:spTree>
+    <p:extLst>
+      <p:ext uri="{BB962C8B-B14F-4D97-AF65-F5344CB8AC3E}">
+        <p14:creationId xmlns:p14="http://schemas.microsoft.com/office/powerpoint/2010/main" val="1245628066"/>
+      </p:ext>
+    </p:extLst>
+  </p:cSld>
+  <p:clrMapOvr>
+    <a:masterClrMapping/>
+  </p:clrMapOvr>
+</p:notes>
+</file>
+
+<file path=ppt/notesSlides/notesSlide2.xml><?xml version="1.0" encoding="utf-8"?>
+<p:notes xmlns:a="http://schemas.openxmlformats.org/drawingml/2006/main" xmlns:r="http://schemas.openxmlformats.org/officeDocument/2006/relationships" xmlns:p="http://schemas.openxmlformats.org/presentationml/2006/main">
+  <p:cSld>
+    <p:spTree>
+      <p:nvGrpSpPr>
+        <p:cNvPr id="1" name=""/>
+        <p:cNvGrpSpPr/>
+        <p:nvPr/>
+      </p:nvGrpSpPr>
+      <p:grpSpPr>
+        <a:xfrm>
+          <a:off x="0" y="0"/>
+          <a:ext cx="0" cy="0"/>
+          <a:chOff x="0" y="0"/>
+          <a:chExt cx="0" cy="0"/>
+        </a:xfrm>
+      </p:grpSpPr>
+      <p:sp>
+        <p:nvSpPr>
+          <p:cNvPr id="2" name="Slide Image Placeholder 1"/>
+          <p:cNvSpPr>
+            <a:spLocks noGrp="1" noRot="1" noChangeAspect="1"/>
+          </p:cNvSpPr>
+          <p:nvPr>
+            <p:ph type="sldImg"/>
+          </p:nvPr>
+        </p:nvSpPr>
+        <p:spPr/>
+      </p:sp>
+      <p:sp>
+        <p:nvSpPr>
+          <p:cNvPr id="3" name="Notes Placeholder 2"/>
+          <p:cNvSpPr>
+            <a:spLocks noGrp="1"/>
+          </p:cNvSpPr>
+          <p:nvPr>
+            <p:ph type="body" idx="1"/>
+          </p:nvPr>
+        </p:nvSpPr>
+        <p:spPr/>
+        <p:txBody>
+          <a:bodyPr/>
+          <a:lstStyle/>
+          <a:p>
+            <a:endParaRPr lang="en-US" dirty="0"/>
+          </a:p>
+        </p:txBody>
+      </p:sp>
+      <p:sp>
+        <p:nvSpPr>
+          <p:cNvPr id="4" name="Slide Number Placeholder 3"/>
+          <p:cNvSpPr>
+            <a:spLocks noGrp="1"/>
+          </p:cNvSpPr>
+          <p:nvPr>
+            <p:ph type="sldNum" sz="quarter" idx="5"/>
+          </p:nvPr>
+        </p:nvSpPr>
+        <p:spPr/>
+        <p:txBody>
+          <a:bodyPr/>
+          <a:lstStyle/>
+          <a:p>
+            <a:fld id="{CB797A4D-4A54-014D-A969-C0497745592B}" type="slidenum">
+              <a:rPr lang="en-US" smtClean="0"/>
+              <a:t>2</a:t>
+            </a:fld>
+            <a:endParaRPr lang="en-US"/>
+          </a:p>
+        </p:txBody>
+      </p:sp>
+    </p:spTree>
+    <p:extLst>
+      <p:ext uri="{BB962C8B-B14F-4D97-AF65-F5344CB8AC3E}">
+        <p14:creationId xmlns:p14="http://schemas.microsoft.com/office/powerpoint/2010/main" val="2013914470"/>
+      </p:ext>
+    </p:extLst>
+  </p:cSld>
+  <p:clrMapOvr>
+    <a:masterClrMapping/>
+  </p:clrMapOvr>
+</p:notes>
+</file>
+
+<file path=ppt/notesSlides/notesSlide3.xml><?xml version="1.0" encoding="utf-8"?>
+<p:notes xmlns:a="http://schemas.openxmlformats.org/drawingml/2006/main" xmlns:r="http://schemas.openxmlformats.org/officeDocument/2006/relationships" xmlns:p="http://schemas.openxmlformats.org/presentationml/2006/main">
+  <p:cSld>
+    <p:spTree>
+      <p:nvGrpSpPr>
+        <p:cNvPr id="1" name=""/>
+        <p:cNvGrpSpPr/>
+        <p:nvPr/>
+      </p:nvGrpSpPr>
+      <p:grpSpPr>
+        <a:xfrm>
+          <a:off x="0" y="0"/>
+          <a:ext cx="0" cy="0"/>
+          <a:chOff x="0" y="0"/>
+          <a:chExt cx="0" cy="0"/>
+        </a:xfrm>
+      </p:grpSpPr>
+      <p:sp>
+        <p:nvSpPr>
+          <p:cNvPr id="2" name="Slide Image Placeholder 1"/>
+          <p:cNvSpPr>
+            <a:spLocks noGrp="1" noRot="1" noChangeAspect="1"/>
+          </p:cNvSpPr>
+          <p:nvPr>
+            <p:ph type="sldImg"/>
+          </p:nvPr>
+        </p:nvSpPr>
+        <p:spPr/>
+      </p:sp>
+      <p:sp>
+        <p:nvSpPr>
+          <p:cNvPr id="3" name="Notes Placeholder 2"/>
+          <p:cNvSpPr>
+            <a:spLocks noGrp="1"/>
+          </p:cNvSpPr>
+          <p:nvPr>
+            <p:ph type="body" idx="1"/>
+          </p:nvPr>
+        </p:nvSpPr>
+        <p:spPr/>
+        <p:txBody>
+          <a:bodyPr/>
+          <a:lstStyle/>
+          <a:p>
+            <a:endParaRPr lang="en-US" dirty="0"/>
+          </a:p>
+        </p:txBody>
+      </p:sp>
+      <p:sp>
+        <p:nvSpPr>
+          <p:cNvPr id="4" name="Slide Number Placeholder 3"/>
+          <p:cNvSpPr>
+            <a:spLocks noGrp="1"/>
+          </p:cNvSpPr>
+          <p:nvPr>
+            <p:ph type="sldNum" sz="quarter" idx="5"/>
+          </p:nvPr>
+        </p:nvSpPr>
+        <p:spPr/>
+        <p:txBody>
+          <a:bodyPr/>
+          <a:lstStyle/>
+          <a:p>
+            <a:fld id="{CB797A4D-4A54-014D-A969-C0497745592B}" type="slidenum">
+              <a:rPr lang="en-US" smtClean="0"/>
+              <a:t>3</a:t>
+            </a:fld>
+            <a:endParaRPr lang="en-US"/>
+          </a:p>
+        </p:txBody>
+      </p:sp>
+    </p:spTree>
+    <p:extLst>
+      <p:ext uri="{BB962C8B-B14F-4D97-AF65-F5344CB8AC3E}">
+        <p14:creationId xmlns:p14="http://schemas.microsoft.com/office/powerpoint/2010/main" val="3878775852"/>
+      </p:ext>
+    </p:extLst>
+  </p:cSld>
+  <p:clrMapOvr>
+    <a:masterClrMapping/>
+  </p:clrMapOvr>
+</p:notes>
+</file>
+
+<file path=ppt/notesSlides/notesSlide4.xml><?xml version="1.0" encoding="utf-8"?>
+<p:notes xmlns:a="http://schemas.openxmlformats.org/drawingml/2006/main" xmlns:r="http://schemas.openxmlformats.org/officeDocument/2006/relationships" xmlns:p="http://schemas.openxmlformats.org/presentationml/2006/main">
+  <p:cSld>
+    <p:spTree>
+      <p:nvGrpSpPr>
+        <p:cNvPr id="1" name=""/>
+        <p:cNvGrpSpPr/>
+        <p:nvPr/>
+      </p:nvGrpSpPr>
+      <p:grpSpPr>
+        <a:xfrm>
+          <a:off x="0" y="0"/>
+          <a:ext cx="0" cy="0"/>
+          <a:chOff x="0" y="0"/>
+          <a:chExt cx="0" cy="0"/>
+        </a:xfrm>
+      </p:grpSpPr>
+      <p:sp>
+        <p:nvSpPr>
+          <p:cNvPr id="2" name="Slide Image Placeholder 1"/>
+          <p:cNvSpPr>
+            <a:spLocks noGrp="1" noRot="1" noChangeAspect="1"/>
+          </p:cNvSpPr>
+          <p:nvPr>
+            <p:ph type="sldImg"/>
+          </p:nvPr>
+        </p:nvSpPr>
+        <p:spPr/>
+      </p:sp>
+      <p:sp>
+        <p:nvSpPr>
+          <p:cNvPr id="3" name="Notes Placeholder 2"/>
+          <p:cNvSpPr>
+            <a:spLocks noGrp="1"/>
+          </p:cNvSpPr>
+          <p:nvPr>
+            <p:ph type="body" idx="1"/>
+          </p:nvPr>
+        </p:nvSpPr>
+        <p:spPr/>
+        <p:txBody>
+          <a:bodyPr/>
+          <a:lstStyle/>
+          <a:p>
+            <a:endParaRPr lang="en-US"/>
+          </a:p>
+        </p:txBody>
+      </p:sp>
+      <p:sp>
+        <p:nvSpPr>
+          <p:cNvPr id="4" name="Slide Number Placeholder 3"/>
+          <p:cNvSpPr>
+            <a:spLocks noGrp="1"/>
+          </p:cNvSpPr>
+          <p:nvPr>
+            <p:ph type="sldNum" sz="quarter" idx="5"/>
+          </p:nvPr>
+        </p:nvSpPr>
+        <p:spPr/>
+        <p:txBody>
+          <a:bodyPr/>
+          <a:lstStyle/>
+          <a:p>
+            <a:fld id="{CB797A4D-4A54-014D-A969-C0497745592B}" type="slidenum">
+              <a:rPr lang="en-US" smtClean="0"/>
+              <a:t>7</a:t>
             </a:fld>
             <a:endParaRPr lang="en-US"/>
           </a:p>
@@ -700,7 +953,7 @@
           <a:p>
             <a:fld id="{5EFC74E6-600C-6143-96A1-798B945F6426}" type="datetimeFigureOut">
               <a:rPr lang="en-US" smtClean="0"/>
-              <a:t>11/27/23</a:t>
+              <a:t>12/12/23</a:t>
             </a:fld>
             <a:endParaRPr lang="en-US"/>
           </a:p>
@@ -898,7 +1151,7 @@
           <a:p>
             <a:fld id="{5EFC74E6-600C-6143-96A1-798B945F6426}" type="datetimeFigureOut">
               <a:rPr lang="en-US" smtClean="0"/>
-              <a:t>11/27/23</a:t>
+              <a:t>12/12/23</a:t>
             </a:fld>
             <a:endParaRPr lang="en-US"/>
           </a:p>
@@ -1106,7 +1359,7 @@
           <a:p>
             <a:fld id="{5EFC74E6-600C-6143-96A1-798B945F6426}" type="datetimeFigureOut">
               <a:rPr lang="en-US" smtClean="0"/>
-              <a:t>11/27/23</a:t>
+              <a:t>12/12/23</a:t>
             </a:fld>
             <a:endParaRPr lang="en-US"/>
           </a:p>
@@ -1304,7 +1557,7 @@
           <a:p>
             <a:fld id="{5EFC74E6-600C-6143-96A1-798B945F6426}" type="datetimeFigureOut">
               <a:rPr lang="en-US" smtClean="0"/>
-              <a:t>11/27/23</a:t>
+              <a:t>12/12/23</a:t>
             </a:fld>
             <a:endParaRPr lang="en-US"/>
           </a:p>
@@ -1579,7 +1832,7 @@
           <a:p>
             <a:fld id="{5EFC74E6-600C-6143-96A1-798B945F6426}" type="datetimeFigureOut">
               <a:rPr lang="en-US" smtClean="0"/>
-              <a:t>11/27/23</a:t>
+              <a:t>12/12/23</a:t>
             </a:fld>
             <a:endParaRPr lang="en-US"/>
           </a:p>
@@ -1844,7 +2097,7 @@
           <a:p>
             <a:fld id="{5EFC74E6-600C-6143-96A1-798B945F6426}" type="datetimeFigureOut">
               <a:rPr lang="en-US" smtClean="0"/>
-              <a:t>11/27/23</a:t>
+              <a:t>12/12/23</a:t>
             </a:fld>
             <a:endParaRPr lang="en-US"/>
           </a:p>
@@ -2256,7 +2509,7 @@
           <a:p>
             <a:fld id="{5EFC74E6-600C-6143-96A1-798B945F6426}" type="datetimeFigureOut">
               <a:rPr lang="en-US" smtClean="0"/>
-              <a:t>11/27/23</a:t>
+              <a:t>12/12/23</a:t>
             </a:fld>
             <a:endParaRPr lang="en-US"/>
           </a:p>
@@ -2397,7 +2650,7 @@
           <a:p>
             <a:fld id="{5EFC74E6-600C-6143-96A1-798B945F6426}" type="datetimeFigureOut">
               <a:rPr lang="en-US" smtClean="0"/>
-              <a:t>11/27/23</a:t>
+              <a:t>12/12/23</a:t>
             </a:fld>
             <a:endParaRPr lang="en-US"/>
           </a:p>
@@ -2510,7 +2763,7 @@
           <a:p>
             <a:fld id="{5EFC74E6-600C-6143-96A1-798B945F6426}" type="datetimeFigureOut">
               <a:rPr lang="en-US" smtClean="0"/>
-              <a:t>11/27/23</a:t>
+              <a:t>12/12/23</a:t>
             </a:fld>
             <a:endParaRPr lang="en-US"/>
           </a:p>
@@ -2821,7 +3074,7 @@
           <a:p>
             <a:fld id="{5EFC74E6-600C-6143-96A1-798B945F6426}" type="datetimeFigureOut">
               <a:rPr lang="en-US" smtClean="0"/>
-              <a:t>11/27/23</a:t>
+              <a:t>12/12/23</a:t>
             </a:fld>
             <a:endParaRPr lang="en-US"/>
           </a:p>
@@ -3109,7 +3362,7 @@
           <a:p>
             <a:fld id="{5EFC74E6-600C-6143-96A1-798B945F6426}" type="datetimeFigureOut">
               <a:rPr lang="en-US" smtClean="0"/>
-              <a:t>11/27/23</a:t>
+              <a:t>12/12/23</a:t>
             </a:fld>
             <a:endParaRPr lang="en-US"/>
           </a:p>
@@ -3350,7 +3603,7 @@
           <a:p>
             <a:fld id="{5EFC74E6-600C-6143-96A1-798B945F6426}" type="datetimeFigureOut">
               <a:rPr lang="en-US" smtClean="0"/>
-              <a:t>11/27/23</a:t>
+              <a:t>12/12/23</a:t>
             </a:fld>
             <a:endParaRPr lang="en-US"/>
           </a:p>
@@ -3781,10 +4034,10 @@
         </p:nvGrpSpPr>
         <p:grpSpPr>
           <a:xfrm>
-            <a:off x="2155719" y="483157"/>
-            <a:ext cx="8274692" cy="7300254"/>
-            <a:chOff x="2155719" y="483157"/>
-            <a:chExt cx="8274692" cy="7300254"/>
+            <a:off x="2155719" y="434798"/>
+            <a:ext cx="8371830" cy="7296446"/>
+            <a:chOff x="2155719" y="434798"/>
+            <a:chExt cx="8371830" cy="7296446"/>
           </a:xfrm>
         </p:grpSpPr>
         <p:pic>
@@ -3802,14 +4055,14 @@
             <p:nvPr/>
           </p:nvPicPr>
           <p:blipFill>
-            <a:blip r:embed="rId2"/>
+            <a:blip r:embed="rId3"/>
             <a:stretch>
               <a:fillRect/>
             </a:stretch>
           </p:blipFill>
           <p:spPr>
             <a:xfrm>
-              <a:off x="6096000" y="733853"/>
+              <a:off x="6193138" y="681686"/>
               <a:ext cx="4334411" cy="3674002"/>
             </a:xfrm>
             <a:prstGeom prst="rect">
@@ -3831,10 +4084,10 @@
           </p:nvGrpSpPr>
           <p:grpSpPr>
             <a:xfrm>
-              <a:off x="2155719" y="483157"/>
-              <a:ext cx="6570969" cy="7300254"/>
-              <a:chOff x="2155719" y="483157"/>
-              <a:chExt cx="6570969" cy="7300254"/>
+              <a:off x="2155719" y="434798"/>
+              <a:ext cx="6668107" cy="7296446"/>
+              <a:chOff x="2155719" y="434798"/>
+              <a:chExt cx="6668107" cy="7296446"/>
             </a:xfrm>
           </p:grpSpPr>
           <p:grpSp>
@@ -3851,10 +4104,10 @@
             </p:nvGrpSpPr>
             <p:grpSpPr>
               <a:xfrm>
-                <a:off x="2155719" y="483157"/>
-                <a:ext cx="6570969" cy="7300254"/>
-                <a:chOff x="2155719" y="551395"/>
-                <a:chExt cx="6570969" cy="7300254"/>
+                <a:off x="2155719" y="434798"/>
+                <a:ext cx="6668107" cy="7296446"/>
+                <a:chOff x="2155719" y="503036"/>
+                <a:chExt cx="6668107" cy="7296446"/>
               </a:xfrm>
             </p:grpSpPr>
             <p:grpSp>
@@ -3872,9 +4125,9 @@
               <p:grpSpPr>
                 <a:xfrm>
                   <a:off x="2155719" y="704193"/>
-                  <a:ext cx="6570969" cy="7147456"/>
+                  <a:ext cx="6668107" cy="7095289"/>
                   <a:chOff x="2166230" y="0"/>
-                  <a:chExt cx="6570969" cy="7147456"/>
+                  <a:chExt cx="6668107" cy="7095289"/>
                 </a:xfrm>
               </p:grpSpPr>
               <p:pic>
@@ -3892,7 +4145,7 @@
                   <p:nvPr/>
                 </p:nvPicPr>
                 <p:blipFill>
-                  <a:blip r:embed="rId3"/>
+                  <a:blip r:embed="rId4"/>
                   <a:stretch>
                     <a:fillRect/>
                   </a:stretch>
@@ -3922,14 +4175,14 @@
                   <p:nvPr/>
                 </p:nvPicPr>
                 <p:blipFill>
-                  <a:blip r:embed="rId4"/>
+                  <a:blip r:embed="rId5"/>
                   <a:stretch>
                     <a:fillRect/>
                   </a:stretch>
                 </p:blipFill>
                 <p:spPr>
                   <a:xfrm>
-                    <a:off x="3281546" y="4037734"/>
+                    <a:off x="3378684" y="3985567"/>
                     <a:ext cx="5455653" cy="3109722"/>
                   </a:xfrm>
                   <a:prstGeom prst="rect">
@@ -3953,15 +4206,15 @@
                 <p:nvPr/>
               </p:nvPicPr>
               <p:blipFill>
-                <a:blip r:embed="rId5"/>
+                <a:blip r:embed="rId6"/>
                 <a:stretch>
                   <a:fillRect/>
                 </a:stretch>
               </p:blipFill>
               <p:spPr>
                 <a:xfrm>
-                  <a:off x="2610817" y="551395"/>
-                  <a:ext cx="228575" cy="246158"/>
+                  <a:off x="2305025" y="503036"/>
+                  <a:ext cx="228575" cy="246888"/>
                 </a:xfrm>
                 <a:prstGeom prst="rect">
                   <a:avLst/>
@@ -3983,14 +4236,14 @@
                 <p:nvPr/>
               </p:nvPicPr>
               <p:blipFill>
-                <a:blip r:embed="rId6"/>
+                <a:blip r:embed="rId7"/>
                 <a:stretch>
                   <a:fillRect/>
                 </a:stretch>
               </p:blipFill>
               <p:spPr>
                 <a:xfrm>
-                  <a:off x="6382717" y="551395"/>
+                  <a:off x="6277036" y="503036"/>
                   <a:ext cx="229253" cy="246888"/>
                 </a:xfrm>
                 <a:prstGeom prst="rect">
@@ -4013,14 +4266,14 @@
                 <p:nvPr/>
               </p:nvPicPr>
               <p:blipFill>
-                <a:blip r:embed="rId7"/>
+                <a:blip r:embed="rId8"/>
                 <a:stretch>
                   <a:fillRect/>
                 </a:stretch>
               </p:blipFill>
               <p:spPr>
                 <a:xfrm>
-                  <a:off x="4583073" y="4741927"/>
+                  <a:off x="3744174" y="4689760"/>
                   <a:ext cx="228575" cy="260303"/>
                 </a:xfrm>
                 <a:prstGeom prst="rect">
@@ -4044,14 +4297,14 @@
               <p:nvPr/>
             </p:nvPicPr>
             <p:blipFill>
-              <a:blip r:embed="rId8"/>
+              <a:blip r:embed="rId9"/>
               <a:stretch>
                 <a:fillRect/>
               </a:stretch>
             </p:blipFill>
             <p:spPr>
               <a:xfrm>
-                <a:off x="2207887" y="688122"/>
+                <a:off x="2305025" y="635955"/>
                 <a:ext cx="3667565" cy="3667565"/>
               </a:xfrm>
               <a:prstGeom prst="rect">
@@ -4093,6 +4346,257 @@
       </p:grpSpPr>
       <p:grpSp>
         <p:nvGrpSpPr>
+          <p:cNvPr id="9" name="Group 8">
+            <a:extLst>
+              <a:ext uri="{FF2B5EF4-FFF2-40B4-BE49-F238E27FC236}">
+                <a16:creationId xmlns:a16="http://schemas.microsoft.com/office/drawing/2014/main" id="{14B2ACAD-2279-DB43-3F30-6CFD1E780EF0}"/>
+              </a:ext>
+            </a:extLst>
+          </p:cNvPr>
+          <p:cNvGrpSpPr/>
+          <p:nvPr/>
+        </p:nvGrpSpPr>
+        <p:grpSpPr>
+          <a:xfrm>
+            <a:off x="2626491" y="516713"/>
+            <a:ext cx="7627159" cy="6850415"/>
+            <a:chOff x="2626491" y="516713"/>
+            <a:chExt cx="7627159" cy="6850415"/>
+          </a:xfrm>
+        </p:grpSpPr>
+        <p:pic>
+          <p:nvPicPr>
+            <p:cNvPr id="8" name="Picture 7">
+              <a:extLst>
+                <a:ext uri="{FF2B5EF4-FFF2-40B4-BE49-F238E27FC236}">
+                  <a16:creationId xmlns:a16="http://schemas.microsoft.com/office/drawing/2014/main" id="{CDF72044-C9B9-4768-DDCA-46DA1C90ED33}"/>
+                </a:ext>
+              </a:extLst>
+            </p:cNvPr>
+            <p:cNvPicPr>
+              <a:picLocks noChangeAspect="1"/>
+            </p:cNvPicPr>
+            <p:nvPr/>
+          </p:nvPicPr>
+          <p:blipFill rotWithShape="1">
+            <a:blip r:embed="rId3"/>
+            <a:srcRect t="1033"/>
+            <a:stretch/>
+          </p:blipFill>
+          <p:spPr>
+            <a:xfrm>
+              <a:off x="3275785" y="3931632"/>
+              <a:ext cx="6644733" cy="3435496"/>
+            </a:xfrm>
+            <a:prstGeom prst="rect">
+              <a:avLst/>
+            </a:prstGeom>
+          </p:spPr>
+        </p:pic>
+        <p:grpSp>
+          <p:nvGrpSpPr>
+            <p:cNvPr id="30" name="Group 29">
+              <a:extLst>
+                <a:ext uri="{FF2B5EF4-FFF2-40B4-BE49-F238E27FC236}">
+                  <a16:creationId xmlns:a16="http://schemas.microsoft.com/office/drawing/2014/main" id="{321A39E9-394C-4085-D70C-868E06283D42}"/>
+                </a:ext>
+              </a:extLst>
+            </p:cNvPr>
+            <p:cNvGrpSpPr/>
+            <p:nvPr/>
+          </p:nvGrpSpPr>
+          <p:grpSpPr>
+            <a:xfrm>
+              <a:off x="2626491" y="516713"/>
+              <a:ext cx="4001153" cy="3902367"/>
+              <a:chOff x="2610817" y="551395"/>
+              <a:chExt cx="4001153" cy="3902367"/>
+            </a:xfrm>
+          </p:grpSpPr>
+          <p:pic>
+            <p:nvPicPr>
+              <p:cNvPr id="26" name="Picture 25">
+                <a:extLst>
+                  <a:ext uri="{FF2B5EF4-FFF2-40B4-BE49-F238E27FC236}">
+                    <a16:creationId xmlns:a16="http://schemas.microsoft.com/office/drawing/2014/main" id="{4BB8F589-BB19-0DA1-9F08-4C007065C045}"/>
+                  </a:ext>
+                </a:extLst>
+              </p:cNvPr>
+              <p:cNvPicPr>
+                <a:picLocks noChangeAspect="1"/>
+              </p:cNvPicPr>
+              <p:nvPr/>
+            </p:nvPicPr>
+            <p:blipFill>
+              <a:blip r:embed="rId4"/>
+              <a:stretch>
+                <a:fillRect/>
+              </a:stretch>
+            </p:blipFill>
+            <p:spPr>
+              <a:xfrm>
+                <a:off x="2610817" y="551395"/>
+                <a:ext cx="228575" cy="246158"/>
+              </a:xfrm>
+              <a:prstGeom prst="rect">
+                <a:avLst/>
+              </a:prstGeom>
+            </p:spPr>
+          </p:pic>
+          <p:pic>
+            <p:nvPicPr>
+              <p:cNvPr id="27" name="Picture 26">
+                <a:extLst>
+                  <a:ext uri="{FF2B5EF4-FFF2-40B4-BE49-F238E27FC236}">
+                    <a16:creationId xmlns:a16="http://schemas.microsoft.com/office/drawing/2014/main" id="{94E78890-A2DB-3D14-99A6-DEED737B7ECB}"/>
+                  </a:ext>
+                </a:extLst>
+              </p:cNvPr>
+              <p:cNvPicPr>
+                <a:picLocks noChangeAspect="1"/>
+              </p:cNvPicPr>
+              <p:nvPr/>
+            </p:nvPicPr>
+            <p:blipFill>
+              <a:blip r:embed="rId5"/>
+              <a:stretch>
+                <a:fillRect/>
+              </a:stretch>
+            </p:blipFill>
+            <p:spPr>
+              <a:xfrm>
+                <a:off x="6382717" y="551395"/>
+                <a:ext cx="229253" cy="246888"/>
+              </a:xfrm>
+              <a:prstGeom prst="rect">
+                <a:avLst/>
+              </a:prstGeom>
+            </p:spPr>
+          </p:pic>
+          <p:pic>
+            <p:nvPicPr>
+              <p:cNvPr id="29" name="Picture 28">
+                <a:extLst>
+                  <a:ext uri="{FF2B5EF4-FFF2-40B4-BE49-F238E27FC236}">
+                    <a16:creationId xmlns:a16="http://schemas.microsoft.com/office/drawing/2014/main" id="{88712C2C-D2B0-A83D-BCE3-C46E7DB2580A}"/>
+                  </a:ext>
+                </a:extLst>
+              </p:cNvPr>
+              <p:cNvPicPr>
+                <a:picLocks noChangeAspect="1"/>
+              </p:cNvPicPr>
+              <p:nvPr/>
+            </p:nvPicPr>
+            <p:blipFill>
+              <a:blip r:embed="rId6"/>
+              <a:stretch>
+                <a:fillRect/>
+              </a:stretch>
+            </p:blipFill>
+            <p:spPr>
+              <a:xfrm>
+                <a:off x="3260111" y="4193459"/>
+                <a:ext cx="228575" cy="260303"/>
+              </a:xfrm>
+              <a:prstGeom prst="rect">
+                <a:avLst/>
+              </a:prstGeom>
+            </p:spPr>
+          </p:pic>
+        </p:grpSp>
+        <p:pic>
+          <p:nvPicPr>
+            <p:cNvPr id="3" name="Picture 2">
+              <a:extLst>
+                <a:ext uri="{FF2B5EF4-FFF2-40B4-BE49-F238E27FC236}">
+                  <a16:creationId xmlns:a16="http://schemas.microsoft.com/office/drawing/2014/main" id="{B265AF06-12CF-ECC0-3307-50DBD43B77C7}"/>
+                </a:ext>
+              </a:extLst>
+            </p:cNvPr>
+            <p:cNvPicPr>
+              <a:picLocks noChangeAspect="1"/>
+            </p:cNvPicPr>
+            <p:nvPr/>
+          </p:nvPicPr>
+          <p:blipFill>
+            <a:blip r:embed="rId7"/>
+            <a:stretch>
+              <a:fillRect/>
+            </a:stretch>
+          </p:blipFill>
+          <p:spPr>
+            <a:xfrm>
+              <a:off x="6096000" y="778041"/>
+              <a:ext cx="4157650" cy="3153591"/>
+            </a:xfrm>
+            <a:prstGeom prst="rect">
+              <a:avLst/>
+            </a:prstGeom>
+          </p:spPr>
+        </p:pic>
+        <p:pic>
+          <p:nvPicPr>
+            <p:cNvPr id="7" name="Picture 6">
+              <a:extLst>
+                <a:ext uri="{FF2B5EF4-FFF2-40B4-BE49-F238E27FC236}">
+                  <a16:creationId xmlns:a16="http://schemas.microsoft.com/office/drawing/2014/main" id="{8C6554A3-4734-002B-7897-C01F9B6FCDD9}"/>
+                </a:ext>
+              </a:extLst>
+            </p:cNvPr>
+            <p:cNvPicPr>
+              <a:picLocks noChangeAspect="1"/>
+            </p:cNvPicPr>
+            <p:nvPr/>
+          </p:nvPicPr>
+          <p:blipFill>
+            <a:blip r:embed="rId8"/>
+            <a:stretch>
+              <a:fillRect/>
+            </a:stretch>
+          </p:blipFill>
+          <p:spPr>
+            <a:xfrm>
+              <a:off x="2855066" y="726073"/>
+              <a:ext cx="3240934" cy="3223344"/>
+            </a:xfrm>
+            <a:prstGeom prst="rect">
+              <a:avLst/>
+            </a:prstGeom>
+          </p:spPr>
+        </p:pic>
+      </p:grpSp>
+    </p:spTree>
+    <p:extLst>
+      <p:ext uri="{BB962C8B-B14F-4D97-AF65-F5344CB8AC3E}">
+        <p14:creationId xmlns:p14="http://schemas.microsoft.com/office/powerpoint/2010/main" val="2254932660"/>
+      </p:ext>
+    </p:extLst>
+  </p:cSld>
+  <p:clrMapOvr>
+    <a:masterClrMapping/>
+  </p:clrMapOvr>
+</p:sld>
+</file>
+
+<file path=ppt/slides/slide3.xml><?xml version="1.0" encoding="utf-8"?>
+<p:sld xmlns:a="http://schemas.openxmlformats.org/drawingml/2006/main" xmlns:r="http://schemas.openxmlformats.org/officeDocument/2006/relationships" xmlns:p="http://schemas.openxmlformats.org/presentationml/2006/main">
+  <p:cSld>
+    <p:spTree>
+      <p:nvGrpSpPr>
+        <p:cNvPr id="1" name=""/>
+        <p:cNvGrpSpPr/>
+        <p:nvPr/>
+      </p:nvGrpSpPr>
+      <p:grpSpPr>
+        <a:xfrm>
+          <a:off x="0" y="0"/>
+          <a:ext cx="0" cy="0"/>
+          <a:chOff x="0" y="0"/>
+          <a:chExt cx="0" cy="0"/>
+        </a:xfrm>
+      </p:grpSpPr>
+      <p:grpSp>
+        <p:nvGrpSpPr>
           <p:cNvPr id="14" name="Group 13">
             <a:extLst>
               <a:ext uri="{FF2B5EF4-FFF2-40B4-BE49-F238E27FC236}">
@@ -4126,7 +4630,7 @@
             <p:nvPr/>
           </p:nvPicPr>
           <p:blipFill>
-            <a:blip r:embed="rId2"/>
+            <a:blip r:embed="rId3"/>
             <a:stretch>
               <a:fillRect/>
             </a:stretch>
@@ -4156,7 +4660,7 @@
             <p:nvPr/>
           </p:nvPicPr>
           <p:blipFill>
-            <a:blip r:embed="rId3"/>
+            <a:blip r:embed="rId4"/>
             <a:stretch>
               <a:fillRect/>
             </a:stretch>
@@ -4186,7 +4690,7 @@
             <p:nvPr/>
           </p:nvPicPr>
           <p:blipFill>
-            <a:blip r:embed="rId4"/>
+            <a:blip r:embed="rId5"/>
             <a:stretch>
               <a:fillRect/>
             </a:stretch>
@@ -4216,7 +4720,7 @@
             <p:nvPr/>
           </p:nvPicPr>
           <p:blipFill>
-            <a:blip r:embed="rId5"/>
+            <a:blip r:embed="rId6"/>
             <a:stretch>
               <a:fillRect/>
             </a:stretch>
@@ -4245,7 +4749,7 @@
 </p:sld>
 </file>
 
-<file path=ppt/slides/slide3.xml><?xml version="1.0" encoding="utf-8"?>
+<file path=ppt/slides/slide4.xml><?xml version="1.0" encoding="utf-8"?>
 <p:sld xmlns:a="http://schemas.openxmlformats.org/drawingml/2006/main" xmlns:r="http://schemas.openxmlformats.org/officeDocument/2006/relationships" xmlns:p="http://schemas.openxmlformats.org/presentationml/2006/main">
   <p:cSld>
     <p:spTree>
@@ -4355,7 +4859,7 @@
 </p:sld>
 </file>
 
-<file path=ppt/slides/slide4.xml><?xml version="1.0" encoding="utf-8"?>
+<file path=ppt/slides/slide5.xml><?xml version="1.0" encoding="utf-8"?>
 <p:sld xmlns:a="http://schemas.openxmlformats.org/drawingml/2006/main" xmlns:r="http://schemas.openxmlformats.org/officeDocument/2006/relationships" xmlns:p="http://schemas.openxmlformats.org/presentationml/2006/main">
   <p:cSld>
     <p:spTree>
@@ -4443,7 +4947,7 @@
 </p:sld>
 </file>
 
-<file path=ppt/slides/slide5.xml><?xml version="1.0" encoding="utf-8"?>
+<file path=ppt/slides/slide6.xml><?xml version="1.0" encoding="utf-8"?>
 <p:sld xmlns:a="http://schemas.openxmlformats.org/drawingml/2006/main" xmlns:r="http://schemas.openxmlformats.org/officeDocument/2006/relationships" xmlns:p="http://schemas.openxmlformats.org/presentationml/2006/main">
   <p:cSld>
     <p:spTree>
@@ -4553,7 +5057,7 @@
 </p:sld>
 </file>
 
-<file path=ppt/slides/slide6.xml><?xml version="1.0" encoding="utf-8"?>
+<file path=ppt/slides/slide7.xml><?xml version="1.0" encoding="utf-8"?>
 <p:sld xmlns:a="http://schemas.openxmlformats.org/drawingml/2006/main" xmlns:r="http://schemas.openxmlformats.org/officeDocument/2006/relationships" xmlns:p="http://schemas.openxmlformats.org/presentationml/2006/main">
   <p:cSld>
     <p:spTree>

</xml_diff>